<commit_message>
optimized slides for presentation
</commit_message>
<xml_diff>
--- a/csce438.pptx
+++ b/csce438.pptx
@@ -213,7 +213,7 @@
           <a:p>
             <a:fld id="{D3236F3F-3A30-4F0D-B2D3-0B3699C20A5F}" type="datetimeFigureOut">
               <a:rPr lang="en-US" smtClean="0"/>
-              <a:t>4/20/2015</a:t>
+              <a:t>4/22/2015</a:t>
             </a:fld>
             <a:endParaRPr lang="en-US" dirty="0"/>
           </a:p>
@@ -903,7 +903,7 @@
           <a:p>
             <a:fld id="{3ECA1A43-AC8E-4C5B-AAD3-D8A70D0AB19B}" type="datetimeFigureOut">
               <a:rPr lang="en-US" smtClean="0"/>
-              <a:t>4/20/2015</a:t>
+              <a:t>4/22/2015</a:t>
             </a:fld>
             <a:endParaRPr lang="en-US" dirty="0"/>
           </a:p>
@@ -1115,7 +1115,7 @@
           <a:p>
             <a:fld id="{3ECA1A43-AC8E-4C5B-AAD3-D8A70D0AB19B}" type="datetimeFigureOut">
               <a:rPr lang="en-US" smtClean="0"/>
-              <a:t>4/20/2015</a:t>
+              <a:t>4/22/2015</a:t>
             </a:fld>
             <a:endParaRPr lang="en-US" dirty="0"/>
           </a:p>
@@ -1302,7 +1302,7 @@
           <a:p>
             <a:fld id="{3ECA1A43-AC8E-4C5B-AAD3-D8A70D0AB19B}" type="datetimeFigureOut">
               <a:rPr lang="en-US" smtClean="0"/>
-              <a:t>4/20/2015</a:t>
+              <a:t>4/22/2015</a:t>
             </a:fld>
             <a:endParaRPr lang="en-US" dirty="0"/>
           </a:p>
@@ -1399,7 +1399,7 @@
           <a:p>
             <a:fld id="{3ECA1A43-AC8E-4C5B-AAD3-D8A70D0AB19B}" type="datetimeFigureOut">
               <a:rPr lang="en-US" smtClean="0"/>
-              <a:t>4/20/2015</a:t>
+              <a:t>4/22/2015</a:t>
             </a:fld>
             <a:endParaRPr lang="en-US" dirty="0"/>
           </a:p>
@@ -1995,7 +1995,7 @@
           <a:p>
             <a:fld id="{3ECA1A43-AC8E-4C5B-AAD3-D8A70D0AB19B}" type="datetimeFigureOut">
               <a:rPr lang="en-US" smtClean="0"/>
-              <a:t>4/20/2015</a:t>
+              <a:t>4/22/2015</a:t>
             </a:fld>
             <a:endParaRPr lang="en-US" dirty="0"/>
           </a:p>
@@ -2092,7 +2092,7 @@
           <a:p>
             <a:fld id="{3ECA1A43-AC8E-4C5B-AAD3-D8A70D0AB19B}" type="datetimeFigureOut">
               <a:rPr lang="en-US" smtClean="0"/>
-              <a:t>4/20/2015</a:t>
+              <a:t>4/22/2015</a:t>
             </a:fld>
             <a:endParaRPr lang="en-US" dirty="0"/>
           </a:p>
@@ -2697,7 +2697,7 @@
           <a:p>
             <a:fld id="{3ECA1A43-AC8E-4C5B-AAD3-D8A70D0AB19B}" type="datetimeFigureOut">
               <a:rPr lang="en-US" smtClean="0"/>
-              <a:t>4/20/2015</a:t>
+              <a:t>4/22/2015</a:t>
             </a:fld>
             <a:endParaRPr lang="en-US" dirty="0"/>
           </a:p>
@@ -2840,7 +2840,7 @@
           <a:p>
             <a:fld id="{3ECA1A43-AC8E-4C5B-AAD3-D8A70D0AB19B}" type="datetimeFigureOut">
               <a:rPr lang="en-US" smtClean="0"/>
-              <a:t>4/20/2015</a:t>
+              <a:t>4/22/2015</a:t>
             </a:fld>
             <a:endParaRPr lang="en-US" dirty="0"/>
           </a:p>
@@ -2937,7 +2937,7 @@
           <a:p>
             <a:fld id="{3ECA1A43-AC8E-4C5B-AAD3-D8A70D0AB19B}" type="datetimeFigureOut">
               <a:rPr lang="en-US" smtClean="0"/>
-              <a:t>4/20/2015</a:t>
+              <a:t>4/22/2015</a:t>
             </a:fld>
             <a:endParaRPr lang="en-US" dirty="0"/>
           </a:p>
@@ -3221,7 +3221,7 @@
           <a:p>
             <a:fld id="{3ECA1A43-AC8E-4C5B-AAD3-D8A70D0AB19B}" type="datetimeFigureOut">
               <a:rPr lang="en-US" smtClean="0"/>
-              <a:t>4/20/2015</a:t>
+              <a:t>4/22/2015</a:t>
             </a:fld>
             <a:endParaRPr lang="en-US" dirty="0"/>
           </a:p>
@@ -3743,7 +3743,7 @@
           <a:p>
             <a:fld id="{3ECA1A43-AC8E-4C5B-AAD3-D8A70D0AB19B}" type="datetimeFigureOut">
               <a:rPr lang="en-US" smtClean="0"/>
-              <a:t>4/20/2015</a:t>
+              <a:t>4/22/2015</a:t>
             </a:fld>
             <a:endParaRPr lang="en-US" dirty="0"/>
           </a:p>
@@ -4263,7 +4263,7 @@
           <a:p>
             <a:fld id="{3ECA1A43-AC8E-4C5B-AAD3-D8A70D0AB19B}" type="datetimeFigureOut">
               <a:rPr lang="en-US" smtClean="0"/>
-              <a:t>4/20/2015</a:t>
+              <a:t>4/22/2015</a:t>
             </a:fld>
             <a:endParaRPr lang="en-US" dirty="0"/>
           </a:p>
@@ -4863,7 +4863,7 @@
                   </a:schemeClr>
                 </a:solidFill>
               </a:rPr>
-              <a:t>Music and </a:t>
+              <a:t>Movie </a:t>
             </a:r>
             <a:r>
               <a:rPr lang="en-US" sz="3200" dirty="0" smtClean="0">
@@ -4873,17 +4873,7 @@
                   </a:schemeClr>
                 </a:solidFill>
               </a:rPr>
-              <a:t>Music Artist </a:t>
-            </a:r>
-            <a:r>
-              <a:rPr lang="en-US" sz="3200" dirty="0" smtClean="0">
-                <a:solidFill>
-                  <a:schemeClr val="bg2">
-                    <a:lumMod val="25000"/>
-                  </a:schemeClr>
-                </a:solidFill>
-              </a:rPr>
-              <a:t>Search Engine:</a:t>
+              <a:t>and Music Artist Search Engine:</a:t>
             </a:r>
             <a:br>
               <a:rPr lang="en-US" sz="3200" dirty="0" smtClean="0">
@@ -5151,7 +5141,11 @@
               <a:buNone/>
             </a:pPr>
             <a:r>
-              <a:rPr lang="en-US" sz="2800" dirty="0" smtClean="0"/>
+              <a:rPr lang="en-US" sz="2800" dirty="0" smtClean="0">
+                <a:solidFill>
+                  <a:schemeClr val="tx2"/>
+                </a:solidFill>
+              </a:rPr>
               <a:t>We need a simple music artist and movie search engine to do simple online searching job. </a:t>
             </a:r>
           </a:p>
@@ -5364,7 +5358,11 @@
               <a:buChar char="•"/>
             </a:pPr>
             <a:r>
-              <a:rPr lang="en-US" sz="2800" dirty="0" smtClean="0"/>
+              <a:rPr lang="en-US" sz="2800" dirty="0" smtClean="0">
+                <a:solidFill>
+                  <a:schemeClr val="tx2"/>
+                </a:solidFill>
+              </a:rPr>
               <a:t>Construction of Music Artist Search Engine</a:t>
             </a:r>
           </a:p>
@@ -5373,7 +5371,11 @@
               <a:buFont typeface="Arial" panose="020B0604020202020204" pitchFamily="34" charset="0"/>
               <a:buChar char="•"/>
             </a:pPr>
-            <a:endParaRPr lang="en-US" sz="2800" dirty="0"/>
+            <a:endParaRPr lang="en-US" sz="2800" dirty="0">
+              <a:solidFill>
+                <a:schemeClr val="tx2"/>
+              </a:solidFill>
+            </a:endParaRPr>
           </a:p>
           <a:p>
             <a:pPr marL="285750" indent="-285750">
@@ -5381,7 +5383,11 @@
               <a:buChar char="•"/>
             </a:pPr>
             <a:r>
-              <a:rPr lang="en-US" sz="2800" dirty="0" smtClean="0"/>
+              <a:rPr lang="en-US" sz="2800" dirty="0" smtClean="0">
+                <a:solidFill>
+                  <a:schemeClr val="tx2"/>
+                </a:solidFill>
+              </a:rPr>
               <a:t>Construction of Movie Search Engine</a:t>
             </a:r>
           </a:p>
@@ -5390,7 +5396,11 @@
               <a:buFont typeface="Arial" panose="020B0604020202020204" pitchFamily="34" charset="0"/>
               <a:buChar char="•"/>
             </a:pPr>
-            <a:endParaRPr lang="en-US" sz="2800" dirty="0"/>
+            <a:endParaRPr lang="en-US" sz="2800" dirty="0">
+              <a:solidFill>
+                <a:schemeClr val="tx2"/>
+              </a:solidFill>
+            </a:endParaRPr>
           </a:p>
           <a:p>
             <a:pPr marL="285750" indent="-285750">
@@ -5398,14 +5408,26 @@
               <a:buChar char="•"/>
             </a:pPr>
             <a:r>
-              <a:rPr lang="en-US" sz="2800" dirty="0" smtClean="0"/>
+              <a:rPr lang="en-US" sz="2800" dirty="0" smtClean="0">
+                <a:solidFill>
+                  <a:schemeClr val="tx2"/>
+                </a:solidFill>
+              </a:rPr>
               <a:t>Combination of these two tools. </a:t>
             </a:r>
             <a:r>
-              <a:rPr lang="en-US" dirty="0" smtClean="0"/>
+              <a:rPr lang="en-US" dirty="0" smtClean="0">
+                <a:solidFill>
+                  <a:schemeClr val="tx2"/>
+                </a:solidFill>
+              </a:rPr>
               <a:t> </a:t>
             </a:r>
-            <a:endParaRPr lang="en-US" dirty="0"/>
+            <a:endParaRPr lang="en-US" dirty="0">
+              <a:solidFill>
+                <a:schemeClr val="tx2"/>
+              </a:solidFill>
+            </a:endParaRPr>
           </a:p>
         </p:txBody>
       </p:sp>
@@ -5697,71 +5719,151 @@
               <a:buNone/>
             </a:pPr>
             <a:r>
-              <a:rPr lang="en-US" sz="2000" b="0" dirty="0" smtClean="0"/>
+              <a:rPr lang="en-US" sz="2000" b="0" dirty="0" smtClean="0">
+                <a:solidFill>
+                  <a:schemeClr val="tx2"/>
+                </a:solidFill>
+              </a:rPr>
               <a:t>Receive the “click signal”—search music or movie?</a:t>
             </a:r>
             <a:br>
-              <a:rPr lang="en-US" sz="2000" b="0" dirty="0" smtClean="0"/>
+              <a:rPr lang="en-US" sz="2000" b="0" dirty="0" smtClean="0">
+                <a:solidFill>
+                  <a:schemeClr val="tx2"/>
+                </a:solidFill>
+              </a:rPr>
             </a:br>
             <a:r>
-              <a:rPr lang="en-US" sz="2000" b="0" dirty="0" smtClean="0"/>
+              <a:rPr lang="en-US" sz="2000" b="0" dirty="0" smtClean="0">
+                <a:solidFill>
+                  <a:schemeClr val="tx2"/>
+                </a:solidFill>
+              </a:rPr>
               <a:t>Use function addEventListener(‘click’, musicFun/movieFun);</a:t>
             </a:r>
             <a:br>
-              <a:rPr lang="en-US" sz="2000" b="0" dirty="0" smtClean="0"/>
+              <a:rPr lang="en-US" sz="2000" b="0" dirty="0" smtClean="0">
+                <a:solidFill>
+                  <a:schemeClr val="tx2"/>
+                </a:solidFill>
+              </a:rPr>
             </a:br>
             <a:r>
-              <a:rPr lang="en-US" sz="2000" b="0" dirty="0"/>
+              <a:rPr lang="en-US" sz="2000" b="0" dirty="0">
+                <a:solidFill>
+                  <a:schemeClr val="tx2"/>
+                </a:solidFill>
+              </a:rPr>
               <a:t/>
             </a:r>
             <a:br>
-              <a:rPr lang="en-US" sz="2000" b="0" dirty="0"/>
+              <a:rPr lang="en-US" sz="2000" b="0" dirty="0">
+                <a:solidFill>
+                  <a:schemeClr val="tx2"/>
+                </a:solidFill>
+              </a:rPr>
             </a:br>
             <a:r>
-              <a:rPr lang="en-US" sz="2000" b="0" dirty="0" smtClean="0"/>
+              <a:rPr lang="en-US" sz="2000" b="0" dirty="0" smtClean="0">
+                <a:solidFill>
+                  <a:schemeClr val="tx2"/>
+                </a:solidFill>
+              </a:rPr>
               <a:t>Enter music search engine function or movie search engine function musicFun() or movieFun();</a:t>
             </a:r>
             <a:br>
-              <a:rPr lang="en-US" sz="2000" b="0" dirty="0" smtClean="0"/>
+              <a:rPr lang="en-US" sz="2000" b="0" dirty="0" smtClean="0">
+                <a:solidFill>
+                  <a:schemeClr val="tx2"/>
+                </a:solidFill>
+              </a:rPr>
             </a:br>
+            <a:r>
+              <a:rPr lang="en-US" sz="2000" b="0" dirty="0" smtClean="0">
+                <a:solidFill>
+                  <a:schemeClr val="tx2"/>
+                </a:solidFill>
+              </a:rPr>
+              <a:t/>
+            </a:r>
+            <a:br>
+              <a:rPr lang="en-US" sz="2000" b="0" dirty="0" smtClean="0">
+                <a:solidFill>
+                  <a:schemeClr val="tx2"/>
+                </a:solidFill>
+              </a:rPr>
+            </a:br>
+            <a:r>
+              <a:rPr lang="en-US" sz="2000" b="0" dirty="0" smtClean="0">
+                <a:solidFill>
+                  <a:schemeClr val="tx2"/>
+                </a:solidFill>
+              </a:rPr>
+              <a:t>musicFun(): use last.fm API to obtain the object that contains all the information about the music artist. Parse the object information step by step to obtain the image, bio, top albums, origin and genres information. </a:t>
+            </a:r>
+            <a:br>
+              <a:rPr lang="en-US" sz="2000" b="0" dirty="0" smtClean="0">
+                <a:solidFill>
+                  <a:schemeClr val="tx2"/>
+                </a:solidFill>
+              </a:rPr>
+            </a:br>
+            <a:r>
+              <a:rPr lang="en-US" sz="2000" b="0" dirty="0">
+                <a:solidFill>
+                  <a:schemeClr val="tx2"/>
+                </a:solidFill>
+              </a:rPr>
+              <a:t/>
+            </a:r>
+            <a:br>
+              <a:rPr lang="en-US" sz="2000" b="0" dirty="0">
+                <a:solidFill>
+                  <a:schemeClr val="tx2"/>
+                </a:solidFill>
+              </a:rPr>
+            </a:br>
+            <a:r>
+              <a:rPr lang="en-US" sz="2000" b="0" dirty="0" smtClean="0">
+                <a:solidFill>
+                  <a:schemeClr val="tx2"/>
+                </a:solidFill>
+              </a:rPr>
+              <a:t>movieFun(): use movie DB API to obtain the object that contains all the information about the movie. Parse the object information step by step to obtain the images, cast, review, release data, rating average, total number of ratings and similar movies information.</a:t>
+            </a:r>
+            <a:br>
+              <a:rPr lang="en-US" sz="2000" b="0" dirty="0" smtClean="0">
+                <a:solidFill>
+                  <a:schemeClr val="tx2"/>
+                </a:solidFill>
+              </a:rPr>
+            </a:br>
+            <a:r>
+              <a:rPr lang="en-US" sz="2000" b="0" dirty="0">
+                <a:solidFill>
+                  <a:schemeClr val="tx2"/>
+                </a:solidFill>
+              </a:rPr>
+              <a:t/>
+            </a:r>
+            <a:br>
+              <a:rPr lang="en-US" sz="2000" b="0" dirty="0">
+                <a:solidFill>
+                  <a:schemeClr val="tx2"/>
+                </a:solidFill>
+              </a:rPr>
+            </a:br>
+            <a:r>
+              <a:rPr lang="en-US" sz="2000" b="0" dirty="0" smtClean="0">
+                <a:solidFill>
+                  <a:schemeClr val="tx2"/>
+                </a:solidFill>
+              </a:rPr>
+              <a:t>backFun(): Once “back to search” button is clicked, everything in current page is cleared and the initial page is shown.  </a:t>
+            </a:r>
             <a:r>
               <a:rPr lang="en-US" sz="2000" b="0" dirty="0" smtClean="0"/>
               <a:t/>
-            </a:r>
-            <a:br>
-              <a:rPr lang="en-US" sz="2000" b="0" dirty="0" smtClean="0"/>
-            </a:br>
-            <a:r>
-              <a:rPr lang="en-US" sz="2000" b="0" dirty="0" smtClean="0"/>
-              <a:t>musicFun(): use last.fm API to obtain the object that contains all the information about the music artist. Parse the object information step by step to obtain the image, bio, top albums, origin and genres information. </a:t>
-            </a:r>
-            <a:br>
-              <a:rPr lang="en-US" sz="2000" b="0" dirty="0" smtClean="0"/>
-            </a:br>
-            <a:r>
-              <a:rPr lang="en-US" sz="2000" b="0" dirty="0"/>
-              <a:t/>
-            </a:r>
-            <a:br>
-              <a:rPr lang="en-US" sz="2000" b="0" dirty="0"/>
-            </a:br>
-            <a:r>
-              <a:rPr lang="en-US" sz="2000" b="0" dirty="0" smtClean="0"/>
-              <a:t>movieFun(): use movie DB API to obtain the object that contains all the information about the movie. Parse the object information step by step to obtain the images, cast, review, release data, rating average, total number of ratings and similar movies information.</a:t>
-            </a:r>
-            <a:br>
-              <a:rPr lang="en-US" sz="2000" b="0" dirty="0" smtClean="0"/>
-            </a:br>
-            <a:r>
-              <a:rPr lang="en-US" sz="2000" b="0" dirty="0"/>
-              <a:t/>
-            </a:r>
-            <a:br>
-              <a:rPr lang="en-US" sz="2000" b="0" dirty="0"/>
-            </a:br>
-            <a:r>
-              <a:rPr lang="en-US" sz="2000" b="0" dirty="0" smtClean="0"/>
-              <a:t>backFun(): Once “back to search” button is clicked, everything in current page is cleared and the initial page is shown.  </a:t>
             </a:r>
             <a:br>
               <a:rPr lang="en-US" sz="2000" b="0" dirty="0" smtClean="0"/>
@@ -5947,52 +6049,108 @@
               <a:buNone/>
             </a:pPr>
             <a:r>
-              <a:rPr lang="en-US" sz="2000" dirty="0" smtClean="0"/>
+              <a:rPr lang="en-US" sz="2000" b="0" dirty="0" smtClean="0">
+                <a:solidFill>
+                  <a:schemeClr val="tx2"/>
+                </a:solidFill>
+              </a:rPr>
               <a:t>Through this project, we practice web design skills with JavaScript, HTML, CSS and two APIs. We successfully build a mashup to do simple media search job.</a:t>
             </a:r>
             <a:br>
-              <a:rPr lang="en-US" sz="2000" dirty="0" smtClean="0"/>
+              <a:rPr lang="en-US" sz="2000" b="0" dirty="0" smtClean="0">
+                <a:solidFill>
+                  <a:schemeClr val="tx2"/>
+                </a:solidFill>
+              </a:rPr>
             </a:br>
             <a:r>
-              <a:rPr lang="en-US" sz="2000" dirty="0"/>
+              <a:rPr lang="en-US" sz="2000" b="0" dirty="0">
+                <a:solidFill>
+                  <a:schemeClr val="tx2"/>
+                </a:solidFill>
+              </a:rPr>
               <a:t/>
             </a:r>
             <a:br>
-              <a:rPr lang="en-US" sz="2000" dirty="0"/>
+              <a:rPr lang="en-US" sz="2000" b="0" dirty="0">
+                <a:solidFill>
+                  <a:schemeClr val="tx2"/>
+                </a:solidFill>
+              </a:rPr>
             </a:br>
             <a:r>
-              <a:rPr lang="en-US" sz="2000" dirty="0" smtClean="0"/>
+              <a:rPr lang="en-US" sz="2000" b="0" dirty="0" smtClean="0">
+                <a:solidFill>
+                  <a:schemeClr val="tx2"/>
+                </a:solidFill>
+              </a:rPr>
               <a:t>Due to the short time, we only use two API here, and our program does not handle all the searching ways one can think of to do a media searching job. </a:t>
             </a:r>
             <a:br>
-              <a:rPr lang="en-US" sz="2000" dirty="0" smtClean="0"/>
+              <a:rPr lang="en-US" sz="2000" b="0" dirty="0" smtClean="0">
+                <a:solidFill>
+                  <a:schemeClr val="tx2"/>
+                </a:solidFill>
+              </a:rPr>
             </a:br>
             <a:r>
-              <a:rPr lang="en-US" sz="2000" dirty="0"/>
+              <a:rPr lang="en-US" sz="2000" b="0" dirty="0">
+                <a:solidFill>
+                  <a:schemeClr val="tx2"/>
+                </a:solidFill>
+              </a:rPr>
               <a:t/>
             </a:r>
             <a:br>
-              <a:rPr lang="en-US" sz="2000" dirty="0"/>
+              <a:rPr lang="en-US" sz="2000" b="0" dirty="0">
+                <a:solidFill>
+                  <a:schemeClr val="tx2"/>
+                </a:solidFill>
+              </a:rPr>
             </a:br>
             <a:r>
-              <a:rPr lang="en-US" sz="2000" dirty="0" smtClean="0"/>
+              <a:rPr lang="en-US" sz="2000" b="0" dirty="0" smtClean="0">
+                <a:solidFill>
+                  <a:schemeClr val="tx2"/>
+                </a:solidFill>
+              </a:rPr>
               <a:t>In the future, we can develop this search engine deeply to do search by album name, cast name and so on. </a:t>
             </a:r>
             <a:br>
-              <a:rPr lang="en-US" sz="2000" dirty="0" smtClean="0"/>
+              <a:rPr lang="en-US" sz="2000" b="0" dirty="0" smtClean="0">
+                <a:solidFill>
+                  <a:schemeClr val="tx2"/>
+                </a:solidFill>
+              </a:rPr>
             </a:br>
             <a:r>
-              <a:rPr lang="en-US" sz="2000" dirty="0"/>
+              <a:rPr lang="en-US" sz="2000" b="0" dirty="0">
+                <a:solidFill>
+                  <a:schemeClr val="tx2"/>
+                </a:solidFill>
+              </a:rPr>
               <a:t/>
             </a:r>
             <a:br>
-              <a:rPr lang="en-US" sz="2000" dirty="0"/>
+              <a:rPr lang="en-US" sz="2000" b="0" dirty="0">
+                <a:solidFill>
+                  <a:schemeClr val="tx2"/>
+                </a:solidFill>
+              </a:rPr>
             </a:br>
             <a:r>
-              <a:rPr lang="en-US" sz="2000" dirty="0" smtClean="0"/>
-              <a:t>This project is interesting and it enhances our skills for doing web design.  </a:t>
-            </a:r>
-            <a:endParaRPr lang="en-US" sz="2000" dirty="0"/>
+              <a:rPr lang="en-US" sz="2000" b="0" dirty="0" smtClean="0">
+                <a:solidFill>
+                  <a:schemeClr val="tx2"/>
+                </a:solidFill>
+              </a:rPr>
+              <a:t>This project is interesting and it enhances our skills for doing web design. </a:t>
+            </a:r>
+            <a:r>
+              <a:rPr lang="en-US" sz="2000" b="0" dirty="0" smtClean="0"/>
+              <a:t> </a:t>
+            </a:r>
+            <a:endParaRPr lang="en-US" sz="2000" b="0" dirty="0"/>
           </a:p>
         </p:txBody>
       </p:sp>

</xml_diff>